<commit_message>
designed role of users
</commit_message>
<xml_diff>
--- a/TaskManagementSystem/docs/TaskManagementSystem_relation.pptx
+++ b/TaskManagementSystem/docs/TaskManagementSystem_relation.pptx
@@ -198,7 +198,7 @@
           <a:p>
             <a:fld id="{F32E6392-C039-4C4C-8D0A-79BA7E411071}" type="datetimeFigureOut">
               <a:rPr lang="en-US" smtClean="0"/>
-              <a:t>8/25/20</a:t>
+              <a:t>9/11/20</a:t>
             </a:fld>
             <a:endParaRPr lang="en-US"/>
           </a:p>
@@ -750,7 +750,7 @@
           <a:p>
             <a:fld id="{C58B8DB8-E814-3B4E-8DFE-1F5792A094C4}" type="datetimeFigureOut">
               <a:rPr lang="en-US" smtClean="0"/>
-              <a:t>8/25/20</a:t>
+              <a:t>9/11/20</a:t>
             </a:fld>
             <a:endParaRPr lang="en-US"/>
           </a:p>
@@ -948,7 +948,7 @@
           <a:p>
             <a:fld id="{C58B8DB8-E814-3B4E-8DFE-1F5792A094C4}" type="datetimeFigureOut">
               <a:rPr lang="en-US" smtClean="0"/>
-              <a:t>8/25/20</a:t>
+              <a:t>9/11/20</a:t>
             </a:fld>
             <a:endParaRPr lang="en-US"/>
           </a:p>
@@ -1156,7 +1156,7 @@
           <a:p>
             <a:fld id="{C58B8DB8-E814-3B4E-8DFE-1F5792A094C4}" type="datetimeFigureOut">
               <a:rPr lang="en-US" smtClean="0"/>
-              <a:t>8/25/20</a:t>
+              <a:t>9/11/20</a:t>
             </a:fld>
             <a:endParaRPr lang="en-US"/>
           </a:p>
@@ -1354,7 +1354,7 @@
           <a:p>
             <a:fld id="{C58B8DB8-E814-3B4E-8DFE-1F5792A094C4}" type="datetimeFigureOut">
               <a:rPr lang="en-US" smtClean="0"/>
-              <a:t>8/25/20</a:t>
+              <a:t>9/11/20</a:t>
             </a:fld>
             <a:endParaRPr lang="en-US"/>
           </a:p>
@@ -1629,7 +1629,7 @@
           <a:p>
             <a:fld id="{C58B8DB8-E814-3B4E-8DFE-1F5792A094C4}" type="datetimeFigureOut">
               <a:rPr lang="en-US" smtClean="0"/>
-              <a:t>8/25/20</a:t>
+              <a:t>9/11/20</a:t>
             </a:fld>
             <a:endParaRPr lang="en-US"/>
           </a:p>
@@ -1894,7 +1894,7 @@
           <a:p>
             <a:fld id="{C58B8DB8-E814-3B4E-8DFE-1F5792A094C4}" type="datetimeFigureOut">
               <a:rPr lang="en-US" smtClean="0"/>
-              <a:t>8/25/20</a:t>
+              <a:t>9/11/20</a:t>
             </a:fld>
             <a:endParaRPr lang="en-US"/>
           </a:p>
@@ -2306,7 +2306,7 @@
           <a:p>
             <a:fld id="{C58B8DB8-E814-3B4E-8DFE-1F5792A094C4}" type="datetimeFigureOut">
               <a:rPr lang="en-US" smtClean="0"/>
-              <a:t>8/25/20</a:t>
+              <a:t>9/11/20</a:t>
             </a:fld>
             <a:endParaRPr lang="en-US"/>
           </a:p>
@@ -2447,7 +2447,7 @@
           <a:p>
             <a:fld id="{C58B8DB8-E814-3B4E-8DFE-1F5792A094C4}" type="datetimeFigureOut">
               <a:rPr lang="en-US" smtClean="0"/>
-              <a:t>8/25/20</a:t>
+              <a:t>9/11/20</a:t>
             </a:fld>
             <a:endParaRPr lang="en-US"/>
           </a:p>
@@ -2560,7 +2560,7 @@
           <a:p>
             <a:fld id="{C58B8DB8-E814-3B4E-8DFE-1F5792A094C4}" type="datetimeFigureOut">
               <a:rPr lang="en-US" smtClean="0"/>
-              <a:t>8/25/20</a:t>
+              <a:t>9/11/20</a:t>
             </a:fld>
             <a:endParaRPr lang="en-US"/>
           </a:p>
@@ -2871,7 +2871,7 @@
           <a:p>
             <a:fld id="{C58B8DB8-E814-3B4E-8DFE-1F5792A094C4}" type="datetimeFigureOut">
               <a:rPr lang="en-US" smtClean="0"/>
-              <a:t>8/25/20</a:t>
+              <a:t>9/11/20</a:t>
             </a:fld>
             <a:endParaRPr lang="en-US"/>
           </a:p>
@@ -3159,7 +3159,7 @@
           <a:p>
             <a:fld id="{C58B8DB8-E814-3B4E-8DFE-1F5792A094C4}" type="datetimeFigureOut">
               <a:rPr lang="en-US" smtClean="0"/>
-              <a:t>8/25/20</a:t>
+              <a:t>9/11/20</a:t>
             </a:fld>
             <a:endParaRPr lang="en-US"/>
           </a:p>
@@ -3400,7 +3400,7 @@
           <a:p>
             <a:fld id="{C58B8DB8-E814-3B4E-8DFE-1F5792A094C4}" type="datetimeFigureOut">
               <a:rPr lang="en-US" smtClean="0"/>
-              <a:t>8/25/20</a:t>
+              <a:t>9/11/20</a:t>
             </a:fld>
             <a:endParaRPr lang="en-US"/>
           </a:p>
@@ -4337,14 +4337,14 @@
           <p:nvPr>
             <p:extLst>
               <p:ext uri="{D42A27DB-BD31-4B8C-83A1-F6EECF244321}">
-                <p14:modId xmlns:p14="http://schemas.microsoft.com/office/powerpoint/2010/main" val="2473379392"/>
+                <p14:modId xmlns:p14="http://schemas.microsoft.com/office/powerpoint/2010/main" val="1128287402"/>
               </p:ext>
             </p:extLst>
           </p:nvPr>
         </p:nvGraphicFramePr>
         <p:xfrm>
-          <a:off x="4428725" y="1126070"/>
-          <a:ext cx="2662240" cy="2717349"/>
+          <a:off x="5362150" y="816838"/>
+          <a:ext cx="2500512" cy="2658879"/>
         </p:xfrm>
         <a:graphic>
           <a:graphicData uri="http://schemas.openxmlformats.org/drawingml/2006/table">
@@ -4353,14 +4353,14 @@
                 <a:tableStyleId>{5C22544A-7EE6-4342-B048-85BDC9FD1C3A}</a:tableStyleId>
               </a:tblPr>
               <a:tblGrid>
-                <a:gridCol w="1784286">
+                <a:gridCol w="1457277">
                   <a:extLst>
                     <a:ext uri="{9D8B030D-6E8A-4147-A177-3AD203B41FA5}">
                       <a16:colId xmlns:a16="http://schemas.microsoft.com/office/drawing/2014/main" val="3448023327"/>
                     </a:ext>
                   </a:extLst>
                 </a:gridCol>
-                <a:gridCol w="877954">
+                <a:gridCol w="1043235">
                   <a:extLst>
                     <a:ext uri="{9D8B030D-6E8A-4147-A177-3AD203B41FA5}">
                       <a16:colId xmlns:a16="http://schemas.microsoft.com/office/drawing/2014/main" val="2290228655"/>
@@ -4368,7 +4368,7 @@
                   </a:extLst>
                 </a:gridCol>
               </a:tblGrid>
-              <a:tr h="298737">
+              <a:tr h="258535">
                 <a:tc gridSpan="2">
                   <a:txBody>
                     <a:bodyPr/>
@@ -4376,7 +4376,7 @@
                     <a:p>
                       <a:pPr algn="ctr"/>
                       <a:r>
-                        <a:rPr lang="en-US" dirty="0"/>
+                        <a:rPr lang="en-US" sz="1400" dirty="0"/>
                         <a:t>User</a:t>
                       </a:r>
                     </a:p>
@@ -4399,14 +4399,14 @@
                   </a:ext>
                 </a:extLst>
               </a:tr>
-              <a:tr h="298737">
+              <a:tr h="258535">
                 <a:tc>
                   <a:txBody>
                     <a:bodyPr/>
                     <a:lstStyle/>
                     <a:p>
                       <a:r>
-                        <a:rPr lang="en-US" dirty="0"/>
+                        <a:rPr lang="en-US" sz="1400" dirty="0"/>
                         <a:t>Id</a:t>
                       </a:r>
                     </a:p>
@@ -4419,7 +4419,7 @@
                     <a:lstStyle/>
                     <a:p>
                       <a:r>
-                        <a:rPr lang="en-US" dirty="0"/>
+                        <a:rPr lang="en-US" sz="1400" dirty="0"/>
                         <a:t>integer</a:t>
                       </a:r>
                     </a:p>
@@ -4432,17 +4432,17 @@
                   </a:ext>
                 </a:extLst>
               </a:tr>
-              <a:tr h="298737">
+              <a:tr h="258535">
                 <a:tc>
                   <a:txBody>
                     <a:bodyPr/>
                     <a:lstStyle/>
                     <a:p>
                       <a:r>
-                        <a:rPr lang="en-US" dirty="0" err="1"/>
+                        <a:rPr lang="en-US" sz="1400" dirty="0" err="1"/>
                         <a:t>last_name</a:t>
                       </a:r>
-                      <a:endParaRPr lang="en-US" dirty="0"/>
+                      <a:endParaRPr lang="en-US" sz="1400" dirty="0"/>
                     </a:p>
                   </a:txBody>
                   <a:tcPr/>
@@ -4453,7 +4453,7 @@
                     <a:lstStyle/>
                     <a:p>
                       <a:r>
-                        <a:rPr lang="en-US" dirty="0"/>
+                        <a:rPr lang="en-US" sz="1400" dirty="0"/>
                         <a:t>string</a:t>
                       </a:r>
                     </a:p>
@@ -4466,17 +4466,17 @@
                   </a:ext>
                 </a:extLst>
               </a:tr>
-              <a:tr h="298737">
+              <a:tr h="258535">
                 <a:tc>
                   <a:txBody>
                     <a:bodyPr/>
                     <a:lstStyle/>
                     <a:p>
                       <a:r>
-                        <a:rPr lang="en-US" dirty="0" err="1"/>
+                        <a:rPr lang="en-US" sz="1400" dirty="0" err="1"/>
                         <a:t>first_name</a:t>
                       </a:r>
-                      <a:endParaRPr lang="en-US" dirty="0"/>
+                      <a:endParaRPr lang="en-US" sz="1400" dirty="0"/>
                     </a:p>
                   </a:txBody>
                   <a:tcPr/>
@@ -4487,7 +4487,7 @@
                     <a:lstStyle/>
                     <a:p>
                       <a:r>
-                        <a:rPr lang="en-US" dirty="0"/>
+                        <a:rPr lang="en-US" sz="1400" dirty="0"/>
                         <a:t>string</a:t>
                       </a:r>
                     </a:p>
@@ -4500,14 +4500,14 @@
                   </a:ext>
                 </a:extLst>
               </a:tr>
-              <a:tr h="298737">
+              <a:tr h="258535">
                 <a:tc>
                   <a:txBody>
                     <a:bodyPr/>
                     <a:lstStyle/>
                     <a:p>
                       <a:r>
-                        <a:rPr lang="en-US" dirty="0"/>
+                        <a:rPr lang="en-US" sz="1400" dirty="0"/>
                         <a:t>email</a:t>
                       </a:r>
                     </a:p>
@@ -4520,7 +4520,7 @@
                     <a:lstStyle/>
                     <a:p>
                       <a:r>
-                        <a:rPr lang="en-US" dirty="0"/>
+                        <a:rPr lang="en-US" sz="1400" dirty="0"/>
                         <a:t>string</a:t>
                       </a:r>
                     </a:p>
@@ -4533,16 +4533,17 @@
                   </a:ext>
                 </a:extLst>
               </a:tr>
-              <a:tr h="298737">
+              <a:tr h="378293">
                 <a:tc>
                   <a:txBody>
                     <a:bodyPr/>
                     <a:lstStyle/>
                     <a:p>
                       <a:r>
-                        <a:rPr lang="en-US" dirty="0"/>
-                        <a:t>password</a:t>
-                      </a:r>
+                        <a:rPr lang="en-US" sz="1400" dirty="0" err="1"/>
+                        <a:t>password_digest</a:t>
+                      </a:r>
+                      <a:endParaRPr lang="en-US" sz="1400" dirty="0"/>
                     </a:p>
                   </a:txBody>
                   <a:tcPr/>
@@ -4553,7 +4554,7 @@
                     <a:lstStyle/>
                     <a:p>
                       <a:r>
-                        <a:rPr lang="en-US" dirty="0"/>
+                        <a:rPr lang="en-US" sz="1400" dirty="0"/>
                         <a:t>string</a:t>
                       </a:r>
                     </a:p>
@@ -4562,21 +4563,21 @@
                 </a:tc>
                 <a:extLst>
                   <a:ext uri="{0D108BD9-81ED-4DB2-BD59-A6C34878D82A}">
-                    <a16:rowId xmlns:a16="http://schemas.microsoft.com/office/drawing/2014/main" val="4152723303"/>
+                    <a16:rowId xmlns:a16="http://schemas.microsoft.com/office/drawing/2014/main" val="2950346607"/>
                   </a:ext>
                 </a:extLst>
               </a:tr>
-              <a:tr h="522789">
+              <a:tr h="378293">
                 <a:tc>
                   <a:txBody>
                     <a:bodyPr/>
                     <a:lstStyle/>
                     <a:p>
                       <a:r>
-                        <a:rPr lang="en-US" dirty="0" err="1"/>
-                        <a:t>password_digest</a:t>
-                      </a:r>
-                      <a:endParaRPr lang="en-US" dirty="0"/>
+                        <a:rPr lang="en-US" sz="1400" dirty="0" err="1"/>
+                        <a:t>created_at</a:t>
+                      </a:r>
+                      <a:endParaRPr lang="en-US" sz="1400" dirty="0"/>
                     </a:p>
                   </a:txBody>
                   <a:tcPr/>
@@ -4587,8 +4588,8 @@
                     <a:lstStyle/>
                     <a:p>
                       <a:r>
-                        <a:rPr lang="en-US" dirty="0"/>
-                        <a:t>string</a:t>
+                        <a:rPr lang="en-US" sz="1400" dirty="0"/>
+                        <a:t>timestamp</a:t>
                       </a:r>
                     </a:p>
                   </a:txBody>
@@ -4596,7 +4597,41 @@
                 </a:tc>
                 <a:extLst>
                   <a:ext uri="{0D108BD9-81ED-4DB2-BD59-A6C34878D82A}">
-                    <a16:rowId xmlns:a16="http://schemas.microsoft.com/office/drawing/2014/main" val="2950346607"/>
+                    <a16:rowId xmlns:a16="http://schemas.microsoft.com/office/drawing/2014/main" val="3697879005"/>
+                  </a:ext>
+                </a:extLst>
+              </a:tr>
+              <a:tr h="378293">
+                <a:tc>
+                  <a:txBody>
+                    <a:bodyPr/>
+                    <a:lstStyle/>
+                    <a:p>
+                      <a:r>
+                        <a:rPr lang="en-US" sz="1400" dirty="0" err="1"/>
+                        <a:t>updated_at</a:t>
+                      </a:r>
+                      <a:endParaRPr lang="en-US" sz="1400" dirty="0"/>
+                    </a:p>
+                  </a:txBody>
+                  <a:tcPr/>
+                </a:tc>
+                <a:tc>
+                  <a:txBody>
+                    <a:bodyPr/>
+                    <a:lstStyle/>
+                    <a:p>
+                      <a:r>
+                        <a:rPr lang="en-US" sz="1400" dirty="0"/>
+                        <a:t>timestamp</a:t>
+                      </a:r>
+                    </a:p>
+                  </a:txBody>
+                  <a:tcPr/>
+                </a:tc>
+                <a:extLst>
+                  <a:ext uri="{0D108BD9-81ED-4DB2-BD59-A6C34878D82A}">
+                    <a16:rowId xmlns:a16="http://schemas.microsoft.com/office/drawing/2014/main" val="506495521"/>
                   </a:ext>
                 </a:extLst>
               </a:tr>
@@ -4619,14 +4654,14 @@
           <p:nvPr>
             <p:extLst>
               <p:ext uri="{D42A27DB-BD31-4B8C-83A1-F6EECF244321}">
-                <p14:modId xmlns:p14="http://schemas.microsoft.com/office/powerpoint/2010/main" val="1107776193"/>
+                <p14:modId xmlns:p14="http://schemas.microsoft.com/office/powerpoint/2010/main" val="3364727792"/>
               </p:ext>
             </p:extLst>
           </p:nvPr>
         </p:nvGraphicFramePr>
         <p:xfrm>
-          <a:off x="8393508" y="1153784"/>
-          <a:ext cx="3045636" cy="2926080"/>
+          <a:off x="8417494" y="816838"/>
+          <a:ext cx="3045636" cy="3048000"/>
         </p:xfrm>
         <a:graphic>
           <a:graphicData uri="http://schemas.openxmlformats.org/drawingml/2006/table">
@@ -4658,7 +4693,7 @@
                     <a:p>
                       <a:pPr algn="ctr"/>
                       <a:r>
-                        <a:rPr lang="en-US" dirty="0"/>
+                        <a:rPr lang="en-US" sz="1400" dirty="0"/>
                         <a:t>Task</a:t>
                       </a:r>
                     </a:p>
@@ -4688,7 +4723,7 @@
                     <a:lstStyle/>
                     <a:p>
                       <a:r>
-                        <a:rPr lang="en-US" dirty="0"/>
+                        <a:rPr lang="en-US" sz="1400" dirty="0"/>
                         <a:t>Id</a:t>
                       </a:r>
                     </a:p>
@@ -4701,7 +4736,7 @@
                     <a:lstStyle/>
                     <a:p>
                       <a:r>
-                        <a:rPr lang="en-US" dirty="0"/>
+                        <a:rPr lang="en-US" sz="1400" dirty="0"/>
                         <a:t>integer</a:t>
                       </a:r>
                     </a:p>
@@ -4721,10 +4756,10 @@
                     <a:lstStyle/>
                     <a:p>
                       <a:r>
-                        <a:rPr lang="en-US" dirty="0" err="1"/>
+                        <a:rPr lang="en-US" sz="1400" dirty="0" err="1"/>
                         <a:t>user_id</a:t>
                       </a:r>
-                      <a:endParaRPr lang="en-US" dirty="0"/>
+                      <a:endParaRPr lang="en-US" sz="1400" dirty="0"/>
                     </a:p>
                   </a:txBody>
                   <a:tcPr/>
@@ -4735,7 +4770,7 @@
                     <a:lstStyle/>
                     <a:p>
                       <a:r>
-                        <a:rPr lang="en-US" dirty="0"/>
+                        <a:rPr lang="en-US" sz="1400" dirty="0"/>
                         <a:t>integer</a:t>
                       </a:r>
                     </a:p>
@@ -4755,7 +4790,7 @@
                     <a:lstStyle/>
                     <a:p>
                       <a:r>
-                        <a:rPr lang="en-US" dirty="0"/>
+                        <a:rPr lang="en-US" sz="1400" dirty="0"/>
                         <a:t>status</a:t>
                       </a:r>
                     </a:p>
@@ -4768,7 +4803,7 @@
                     <a:lstStyle/>
                     <a:p>
                       <a:r>
-                        <a:rPr lang="en-US" dirty="0"/>
+                        <a:rPr lang="en-US" sz="1400" dirty="0"/>
                         <a:t>integer</a:t>
                       </a:r>
                     </a:p>
@@ -4788,7 +4823,7 @@
                     <a:lstStyle/>
                     <a:p>
                       <a:r>
-                        <a:rPr lang="en-US" dirty="0"/>
+                        <a:rPr lang="en-US" sz="1400" dirty="0"/>
                         <a:t>title</a:t>
                       </a:r>
                     </a:p>
@@ -4801,7 +4836,7 @@
                     <a:lstStyle/>
                     <a:p>
                       <a:r>
-                        <a:rPr lang="en-US" dirty="0"/>
+                        <a:rPr lang="en-US" sz="1400" dirty="0"/>
                         <a:t>string</a:t>
                       </a:r>
                     </a:p>
@@ -4838,10 +4873,10 @@
                         <a:defRPr/>
                       </a:pPr>
                       <a:r>
-                        <a:rPr lang="en-US"/>
+                        <a:rPr lang="en-US" sz="1400"/>
                         <a:t>description</a:t>
                       </a:r>
-                      <a:endParaRPr lang="en-US" dirty="0"/>
+                      <a:endParaRPr lang="en-US" sz="1400" dirty="0"/>
                     </a:p>
                   </a:txBody>
                   <a:tcPr/>
@@ -4852,7 +4887,7 @@
                     <a:lstStyle/>
                     <a:p>
                       <a:r>
-                        <a:rPr lang="en-US" dirty="0"/>
+                        <a:rPr lang="en-US" sz="1400" dirty="0"/>
                         <a:t>text</a:t>
                       </a:r>
                     </a:p>
@@ -4872,7 +4907,7 @@
                     <a:lstStyle/>
                     <a:p>
                       <a:r>
-                        <a:rPr lang="en-US" dirty="0"/>
+                        <a:rPr lang="en-US" sz="1400" dirty="0"/>
                         <a:t>priority</a:t>
                       </a:r>
                     </a:p>
@@ -4885,7 +4920,7 @@
                     <a:lstStyle/>
                     <a:p>
                       <a:r>
-                        <a:rPr lang="en-US" dirty="0"/>
+                        <a:rPr lang="en-US" sz="1400" dirty="0"/>
                         <a:t>integer</a:t>
                       </a:r>
                     </a:p>
@@ -4905,7 +4940,7 @@
                     <a:lstStyle/>
                     <a:p>
                       <a:r>
-                        <a:rPr lang="en-US" dirty="0"/>
+                        <a:rPr lang="en-US" sz="1400" dirty="0"/>
                         <a:t>deadline</a:t>
                       </a:r>
                     </a:p>
@@ -4918,7 +4953,7 @@
                     <a:lstStyle/>
                     <a:p>
                       <a:r>
-                        <a:rPr lang="en-US" dirty="0"/>
+                        <a:rPr lang="en-US" sz="1400" dirty="0"/>
                         <a:t>datetime</a:t>
                       </a:r>
                     </a:p>
@@ -4928,6 +4963,74 @@
                 <a:extLst>
                   <a:ext uri="{0D108BD9-81ED-4DB2-BD59-A6C34878D82A}">
                     <a16:rowId xmlns:a16="http://schemas.microsoft.com/office/drawing/2014/main" val="3680708120"/>
+                  </a:ext>
+                </a:extLst>
+              </a:tr>
+              <a:tr h="298737">
+                <a:tc>
+                  <a:txBody>
+                    <a:bodyPr/>
+                    <a:lstStyle/>
+                    <a:p>
+                      <a:r>
+                        <a:rPr lang="en-US" sz="1400" dirty="0" err="1"/>
+                        <a:t>created_at</a:t>
+                      </a:r>
+                      <a:endParaRPr lang="en-US" sz="1400" dirty="0"/>
+                    </a:p>
+                  </a:txBody>
+                  <a:tcPr/>
+                </a:tc>
+                <a:tc>
+                  <a:txBody>
+                    <a:bodyPr/>
+                    <a:lstStyle/>
+                    <a:p>
+                      <a:r>
+                        <a:rPr lang="en-US" sz="1400" dirty="0"/>
+                        <a:t>timestamp</a:t>
+                      </a:r>
+                    </a:p>
+                  </a:txBody>
+                  <a:tcPr/>
+                </a:tc>
+                <a:extLst>
+                  <a:ext uri="{0D108BD9-81ED-4DB2-BD59-A6C34878D82A}">
+                    <a16:rowId xmlns:a16="http://schemas.microsoft.com/office/drawing/2014/main" val="1226756112"/>
+                  </a:ext>
+                </a:extLst>
+              </a:tr>
+              <a:tr h="298737">
+                <a:tc>
+                  <a:txBody>
+                    <a:bodyPr/>
+                    <a:lstStyle/>
+                    <a:p>
+                      <a:r>
+                        <a:rPr lang="en-US" sz="1400" dirty="0" err="1"/>
+                        <a:t>updated_at</a:t>
+                      </a:r>
+                      <a:endParaRPr lang="en-US" sz="1400" dirty="0"/>
+                    </a:p>
+                  </a:txBody>
+                  <a:tcPr/>
+                </a:tc>
+                <a:tc>
+                  <a:txBody>
+                    <a:bodyPr/>
+                    <a:lstStyle/>
+                    <a:p>
+                      <a:r>
+                        <a:rPr lang="en-US" sz="1400" dirty="0"/>
+                        <a:t>timestamp</a:t>
+                      </a:r>
+                    </a:p>
+                  </a:txBody>
+                  <a:tcPr/>
+                </a:tc>
+                <a:extLst>
+                  <a:ext uri="{0D108BD9-81ED-4DB2-BD59-A6C34878D82A}">
+                    <a16:rowId xmlns:a16="http://schemas.microsoft.com/office/drawing/2014/main" val="904607813"/>
                   </a:ext>
                 </a:extLst>
               </a:tr>
@@ -4950,14 +5053,14 @@
           <p:nvPr>
             <p:extLst>
               <p:ext uri="{D42A27DB-BD31-4B8C-83A1-F6EECF244321}">
-                <p14:modId xmlns:p14="http://schemas.microsoft.com/office/powerpoint/2010/main" val="638413859"/>
+                <p14:modId xmlns:p14="http://schemas.microsoft.com/office/powerpoint/2010/main" val="1006808969"/>
               </p:ext>
             </p:extLst>
           </p:nvPr>
         </p:nvGraphicFramePr>
         <p:xfrm>
-          <a:off x="4764880" y="4658238"/>
-          <a:ext cx="2662240" cy="1097280"/>
+          <a:off x="5362149" y="4259236"/>
+          <a:ext cx="2500513" cy="1980984"/>
         </p:xfrm>
         <a:graphic>
           <a:graphicData uri="http://schemas.openxmlformats.org/drawingml/2006/table">
@@ -4966,14 +5069,14 @@
                 <a:tableStyleId>{5C22544A-7EE6-4342-B048-85BDC9FD1C3A}</a:tableStyleId>
               </a:tblPr>
               <a:tblGrid>
-                <a:gridCol w="1819276">
+                <a:gridCol w="1407644">
                   <a:extLst>
                     <a:ext uri="{9D8B030D-6E8A-4147-A177-3AD203B41FA5}">
                       <a16:colId xmlns:a16="http://schemas.microsoft.com/office/drawing/2014/main" val="3448023327"/>
                     </a:ext>
                   </a:extLst>
                 </a:gridCol>
-                <a:gridCol w="842964">
+                <a:gridCol w="1092869">
                   <a:extLst>
                     <a:ext uri="{9D8B030D-6E8A-4147-A177-3AD203B41FA5}">
                       <a16:colId xmlns:a16="http://schemas.microsoft.com/office/drawing/2014/main" val="2290228655"/>
@@ -4981,7 +5084,7 @@
                   </a:extLst>
                 </a:gridCol>
               </a:tblGrid>
-              <a:tr h="298737">
+              <a:tr h="304738">
                 <a:tc gridSpan="2">
                   <a:txBody>
                     <a:bodyPr/>
@@ -4989,7 +5092,7 @@
                     <a:p>
                       <a:pPr algn="ctr"/>
                       <a:r>
-                        <a:rPr lang="en-US" dirty="0"/>
+                        <a:rPr lang="en-US" sz="1400" dirty="0"/>
                         <a:t>Label</a:t>
                       </a:r>
                     </a:p>
@@ -5012,14 +5115,14 @@
                   </a:ext>
                 </a:extLst>
               </a:tr>
-              <a:tr h="298737">
+              <a:tr h="304738">
                 <a:tc>
                   <a:txBody>
                     <a:bodyPr/>
                     <a:lstStyle/>
                     <a:p>
                       <a:r>
-                        <a:rPr lang="en-US" dirty="0"/>
+                        <a:rPr lang="en-US" sz="1400" dirty="0"/>
                         <a:t>Id</a:t>
                       </a:r>
                     </a:p>
@@ -5032,7 +5135,7 @@
                     <a:lstStyle/>
                     <a:p>
                       <a:r>
-                        <a:rPr lang="en-US" dirty="0"/>
+                        <a:rPr lang="en-US" sz="1400" dirty="0"/>
                         <a:t>integer</a:t>
                       </a:r>
                     </a:p>
@@ -5045,14 +5148,14 @@
                   </a:ext>
                 </a:extLst>
               </a:tr>
-              <a:tr h="298737">
+              <a:tr h="304738">
                 <a:tc>
                   <a:txBody>
                     <a:bodyPr/>
                     <a:lstStyle/>
                     <a:p>
                       <a:r>
-                        <a:rPr lang="en-US" dirty="0"/>
+                        <a:rPr lang="en-US" sz="1400" dirty="0"/>
                         <a:t>label</a:t>
                       </a:r>
                     </a:p>
@@ -5065,7 +5168,7 @@
                     <a:lstStyle/>
                     <a:p>
                       <a:r>
-                        <a:rPr lang="en-US" dirty="0"/>
+                        <a:rPr lang="en-US" sz="1400" dirty="0"/>
                         <a:t>string</a:t>
                       </a:r>
                     </a:p>
@@ -5075,6 +5178,74 @@
                 <a:extLst>
                   <a:ext uri="{0D108BD9-81ED-4DB2-BD59-A6C34878D82A}">
                     <a16:rowId xmlns:a16="http://schemas.microsoft.com/office/drawing/2014/main" val="233484288"/>
+                  </a:ext>
+                </a:extLst>
+              </a:tr>
+              <a:tr h="533292">
+                <a:tc>
+                  <a:txBody>
+                    <a:bodyPr/>
+                    <a:lstStyle/>
+                    <a:p>
+                      <a:r>
+                        <a:rPr lang="en-US" sz="1400" dirty="0" err="1"/>
+                        <a:t>created_at</a:t>
+                      </a:r>
+                      <a:endParaRPr lang="en-US" sz="1400" dirty="0"/>
+                    </a:p>
+                  </a:txBody>
+                  <a:tcPr/>
+                </a:tc>
+                <a:tc>
+                  <a:txBody>
+                    <a:bodyPr/>
+                    <a:lstStyle/>
+                    <a:p>
+                      <a:r>
+                        <a:rPr lang="en-US" sz="1400" dirty="0"/>
+                        <a:t>timestamp</a:t>
+                      </a:r>
+                    </a:p>
+                  </a:txBody>
+                  <a:tcPr/>
+                </a:tc>
+                <a:extLst>
+                  <a:ext uri="{0D108BD9-81ED-4DB2-BD59-A6C34878D82A}">
+                    <a16:rowId xmlns:a16="http://schemas.microsoft.com/office/drawing/2014/main" val="3959548314"/>
+                  </a:ext>
+                </a:extLst>
+              </a:tr>
+              <a:tr h="533292">
+                <a:tc>
+                  <a:txBody>
+                    <a:bodyPr/>
+                    <a:lstStyle/>
+                    <a:p>
+                      <a:r>
+                        <a:rPr lang="en-US" sz="1400" dirty="0" err="1"/>
+                        <a:t>updated_at</a:t>
+                      </a:r>
+                      <a:endParaRPr lang="en-US" sz="1400" dirty="0"/>
+                    </a:p>
+                  </a:txBody>
+                  <a:tcPr/>
+                </a:tc>
+                <a:tc>
+                  <a:txBody>
+                    <a:bodyPr/>
+                    <a:lstStyle/>
+                    <a:p>
+                      <a:r>
+                        <a:rPr lang="en-US" sz="1400" dirty="0"/>
+                        <a:t>timestamp</a:t>
+                      </a:r>
+                    </a:p>
+                  </a:txBody>
+                  <a:tcPr/>
+                </a:tc>
+                <a:extLst>
+                  <a:ext uri="{0D108BD9-81ED-4DB2-BD59-A6C34878D82A}">
+                    <a16:rowId xmlns:a16="http://schemas.microsoft.com/office/drawing/2014/main" val="372772020"/>
                   </a:ext>
                 </a:extLst>
               </a:tr>
@@ -5097,14 +5268,14 @@
           <p:nvPr>
             <p:extLst>
               <p:ext uri="{D42A27DB-BD31-4B8C-83A1-F6EECF244321}">
-                <p14:modId xmlns:p14="http://schemas.microsoft.com/office/powerpoint/2010/main" val="1854999299"/>
+                <p14:modId xmlns:p14="http://schemas.microsoft.com/office/powerpoint/2010/main" val="1684752745"/>
               </p:ext>
             </p:extLst>
           </p:nvPr>
         </p:nvGraphicFramePr>
         <p:xfrm>
-          <a:off x="8659021" y="4571821"/>
-          <a:ext cx="2131215" cy="1737360"/>
+          <a:off x="8417494" y="4145408"/>
+          <a:ext cx="2804109" cy="2042160"/>
         </p:xfrm>
         <a:graphic>
           <a:graphicData uri="http://schemas.openxmlformats.org/drawingml/2006/table">
@@ -5113,14 +5284,14 @@
                 <a:tableStyleId>{5C22544A-7EE6-4342-B048-85BDC9FD1C3A}</a:tableStyleId>
               </a:tblPr>
               <a:tblGrid>
-                <a:gridCol w="958932">
+                <a:gridCol w="1261698">
                   <a:extLst>
                     <a:ext uri="{9D8B030D-6E8A-4147-A177-3AD203B41FA5}">
                       <a16:colId xmlns:a16="http://schemas.microsoft.com/office/drawing/2014/main" val="3448023327"/>
                     </a:ext>
                   </a:extLst>
                 </a:gridCol>
-                <a:gridCol w="1172283">
+                <a:gridCol w="1542411">
                   <a:extLst>
                     <a:ext uri="{9D8B030D-6E8A-4147-A177-3AD203B41FA5}">
                       <a16:colId xmlns:a16="http://schemas.microsoft.com/office/drawing/2014/main" val="2290228655"/>
@@ -5136,23 +5307,23 @@
                     <a:p>
                       <a:pPr algn="ctr"/>
                       <a:r>
-                        <a:rPr lang="en-US" dirty="0" err="1"/>
+                        <a:rPr lang="en-US" sz="1400" dirty="0" err="1"/>
                         <a:t>TaskLabel</a:t>
                       </a:r>
-                      <a:endParaRPr lang="en-US" dirty="0"/>
+                      <a:endParaRPr lang="en-US" sz="1400" dirty="0"/>
                     </a:p>
                     <a:p>
                       <a:pPr algn="ctr"/>
                       <a:r>
-                        <a:rPr lang="en-US" dirty="0"/>
+                        <a:rPr lang="en-US" sz="1400" dirty="0"/>
                         <a:t>(</a:t>
                       </a:r>
                       <a:r>
-                        <a:rPr lang="ja-JP" altLang="en-US"/>
+                        <a:rPr lang="ja-JP" altLang="en-US" sz="1400"/>
                         <a:t>中間テーブル</a:t>
                       </a:r>
                       <a:r>
-                        <a:rPr lang="en-US" dirty="0"/>
+                        <a:rPr lang="en-US" sz="1400" dirty="0"/>
                         <a:t>)</a:t>
                       </a:r>
                     </a:p>
@@ -5182,7 +5353,7 @@
                     <a:lstStyle/>
                     <a:p>
                       <a:r>
-                        <a:rPr lang="en-US" dirty="0"/>
+                        <a:rPr lang="en-US" sz="1400" dirty="0"/>
                         <a:t>Id</a:t>
                       </a:r>
                     </a:p>
@@ -5195,7 +5366,7 @@
                     <a:lstStyle/>
                     <a:p>
                       <a:r>
-                        <a:rPr lang="en-US" dirty="0"/>
+                        <a:rPr lang="en-US" sz="1400" dirty="0"/>
                         <a:t>integer</a:t>
                       </a:r>
                     </a:p>
@@ -5215,10 +5386,10 @@
                     <a:lstStyle/>
                     <a:p>
                       <a:r>
-                        <a:rPr lang="en-US" dirty="0" err="1"/>
+                        <a:rPr lang="en-US" sz="1400" dirty="0" err="1"/>
                         <a:t>task_id</a:t>
                       </a:r>
-                      <a:endParaRPr lang="en-US" dirty="0"/>
+                      <a:endParaRPr lang="en-US" sz="1400" dirty="0"/>
                     </a:p>
                   </a:txBody>
                   <a:tcPr/>
@@ -5229,7 +5400,7 @@
                     <a:lstStyle/>
                     <a:p>
                       <a:r>
-                        <a:rPr lang="en-US" dirty="0"/>
+                        <a:rPr lang="en-US" sz="1400" dirty="0"/>
                         <a:t>integer</a:t>
                       </a:r>
                     </a:p>
@@ -5249,10 +5420,10 @@
                     <a:lstStyle/>
                     <a:p>
                       <a:r>
-                        <a:rPr lang="en-US" dirty="0" err="1"/>
+                        <a:rPr lang="en-US" sz="1400" dirty="0" err="1"/>
                         <a:t>label_id</a:t>
                       </a:r>
-                      <a:endParaRPr lang="en-US" dirty="0"/>
+                      <a:endParaRPr lang="en-US" sz="1400" dirty="0"/>
                     </a:p>
                   </a:txBody>
                   <a:tcPr/>
@@ -5263,7 +5434,7 @@
                     <a:lstStyle/>
                     <a:p>
                       <a:r>
-                        <a:rPr lang="en-US" dirty="0"/>
+                        <a:rPr lang="en-US" sz="1400" dirty="0"/>
                         <a:t>integer</a:t>
                       </a:r>
                     </a:p>
@@ -5273,6 +5444,74 @@
                 <a:extLst>
                   <a:ext uri="{0D108BD9-81ED-4DB2-BD59-A6C34878D82A}">
                     <a16:rowId xmlns:a16="http://schemas.microsoft.com/office/drawing/2014/main" val="3247799031"/>
+                  </a:ext>
+                </a:extLst>
+              </a:tr>
+              <a:tr h="298737">
+                <a:tc>
+                  <a:txBody>
+                    <a:bodyPr/>
+                    <a:lstStyle/>
+                    <a:p>
+                      <a:r>
+                        <a:rPr lang="en-US" sz="1400" dirty="0" err="1"/>
+                        <a:t>created_at</a:t>
+                      </a:r>
+                      <a:endParaRPr lang="en-US" sz="1400" dirty="0"/>
+                    </a:p>
+                  </a:txBody>
+                  <a:tcPr/>
+                </a:tc>
+                <a:tc>
+                  <a:txBody>
+                    <a:bodyPr/>
+                    <a:lstStyle/>
+                    <a:p>
+                      <a:r>
+                        <a:rPr lang="en-US" sz="1400" dirty="0"/>
+                        <a:t>timestamp</a:t>
+                      </a:r>
+                    </a:p>
+                  </a:txBody>
+                  <a:tcPr/>
+                </a:tc>
+                <a:extLst>
+                  <a:ext uri="{0D108BD9-81ED-4DB2-BD59-A6C34878D82A}">
+                    <a16:rowId xmlns:a16="http://schemas.microsoft.com/office/drawing/2014/main" val="322641427"/>
+                  </a:ext>
+                </a:extLst>
+              </a:tr>
+              <a:tr h="298737">
+                <a:tc>
+                  <a:txBody>
+                    <a:bodyPr/>
+                    <a:lstStyle/>
+                    <a:p>
+                      <a:r>
+                        <a:rPr lang="en-US" sz="1400" dirty="0" err="1"/>
+                        <a:t>updated_at</a:t>
+                      </a:r>
+                      <a:endParaRPr lang="en-US" sz="1400" dirty="0"/>
+                    </a:p>
+                  </a:txBody>
+                  <a:tcPr/>
+                </a:tc>
+                <a:tc>
+                  <a:txBody>
+                    <a:bodyPr/>
+                    <a:lstStyle/>
+                    <a:p>
+                      <a:r>
+                        <a:rPr lang="en-US" sz="1400" dirty="0"/>
+                        <a:t>timestamp</a:t>
+                      </a:r>
+                    </a:p>
+                  </a:txBody>
+                  <a:tcPr/>
+                </a:tc>
+                <a:extLst>
+                  <a:ext uri="{0D108BD9-81ED-4DB2-BD59-A6C34878D82A}">
+                    <a16:rowId xmlns:a16="http://schemas.microsoft.com/office/drawing/2014/main" val="1968893704"/>
                   </a:ext>
                 </a:extLst>
               </a:tr>
@@ -5295,14 +5534,14 @@
           <p:nvPr>
             <p:extLst>
               <p:ext uri="{D42A27DB-BD31-4B8C-83A1-F6EECF244321}">
-                <p14:modId xmlns:p14="http://schemas.microsoft.com/office/powerpoint/2010/main" val="3541989427"/>
+                <p14:modId xmlns:p14="http://schemas.microsoft.com/office/powerpoint/2010/main" val="3393155516"/>
               </p:ext>
             </p:extLst>
           </p:nvPr>
         </p:nvGraphicFramePr>
         <p:xfrm>
-          <a:off x="326228" y="1153784"/>
-          <a:ext cx="2662240" cy="2717349"/>
+          <a:off x="2968548" y="986819"/>
+          <a:ext cx="2116186" cy="2011630"/>
         </p:xfrm>
         <a:graphic>
           <a:graphicData uri="http://schemas.openxmlformats.org/drawingml/2006/table">
@@ -5311,14 +5550,14 @@
                 <a:tableStyleId>{5C22544A-7EE6-4342-B048-85BDC9FD1C3A}</a:tableStyleId>
               </a:tblPr>
               <a:tblGrid>
-                <a:gridCol w="1784286">
+                <a:gridCol w="1034822">
                   <a:extLst>
                     <a:ext uri="{9D8B030D-6E8A-4147-A177-3AD203B41FA5}">
                       <a16:colId xmlns:a16="http://schemas.microsoft.com/office/drawing/2014/main" val="3448023327"/>
                     </a:ext>
                   </a:extLst>
                 </a:gridCol>
-                <a:gridCol w="877954">
+                <a:gridCol w="1081364">
                   <a:extLst>
                     <a:ext uri="{9D8B030D-6E8A-4147-A177-3AD203B41FA5}">
                       <a16:colId xmlns:a16="http://schemas.microsoft.com/office/drawing/2014/main" val="2290228655"/>
@@ -5326,7 +5565,7 @@
                   </a:extLst>
                 </a:gridCol>
               </a:tblGrid>
-              <a:tr h="298737">
+              <a:tr h="284301">
                 <a:tc gridSpan="2">
                   <a:txBody>
                     <a:bodyPr/>
@@ -5334,9 +5573,10 @@
                     <a:p>
                       <a:pPr algn="ctr"/>
                       <a:r>
-                        <a:rPr lang="en-US" dirty="0"/>
-                        <a:t>Admin</a:t>
-                      </a:r>
+                        <a:rPr lang="en-US" sz="1400" dirty="0" err="1"/>
+                        <a:t>UserRole</a:t>
+                      </a:r>
+                      <a:endParaRPr lang="en-US" sz="1400" dirty="0"/>
                     </a:p>
                   </a:txBody>
                   <a:tcPr/>
@@ -5357,14 +5597,14 @@
                   </a:ext>
                 </a:extLst>
               </a:tr>
-              <a:tr h="298737">
+              <a:tr h="284301">
                 <a:tc>
                   <a:txBody>
                     <a:bodyPr/>
                     <a:lstStyle/>
                     <a:p>
                       <a:r>
-                        <a:rPr lang="en-US" dirty="0"/>
+                        <a:rPr lang="en-US" sz="1400" dirty="0"/>
                         <a:t>Id</a:t>
                       </a:r>
                     </a:p>
@@ -5377,7 +5617,7 @@
                     <a:lstStyle/>
                     <a:p>
                       <a:r>
-                        <a:rPr lang="en-US" dirty="0"/>
+                        <a:rPr lang="en-US" sz="1400" dirty="0"/>
                         <a:t>integer</a:t>
                       </a:r>
                     </a:p>
@@ -5390,17 +5630,17 @@
                   </a:ext>
                 </a:extLst>
               </a:tr>
-              <a:tr h="298737">
+              <a:tr h="284301">
                 <a:tc>
                   <a:txBody>
                     <a:bodyPr/>
                     <a:lstStyle/>
                     <a:p>
                       <a:r>
-                        <a:rPr lang="en-US" dirty="0" err="1"/>
-                        <a:t>last_name</a:t>
-                      </a:r>
-                      <a:endParaRPr lang="en-US" dirty="0"/>
+                        <a:rPr lang="en-US" sz="1400" dirty="0" err="1"/>
+                        <a:t>user_id</a:t>
+                      </a:r>
+                      <a:endParaRPr lang="en-US" sz="1400" dirty="0"/>
                     </a:p>
                   </a:txBody>
                   <a:tcPr/>
@@ -5411,8 +5651,8 @@
                     <a:lstStyle/>
                     <a:p>
                       <a:r>
-                        <a:rPr lang="en-US" dirty="0"/>
-                        <a:t>string</a:t>
+                        <a:rPr lang="en-US" sz="1400" dirty="0"/>
+                        <a:t>integer</a:t>
                       </a:r>
                     </a:p>
                   </a:txBody>
@@ -5424,17 +5664,17 @@
                   </a:ext>
                 </a:extLst>
               </a:tr>
-              <a:tr h="298737">
+              <a:tr h="284301">
                 <a:tc>
                   <a:txBody>
                     <a:bodyPr/>
                     <a:lstStyle/>
                     <a:p>
                       <a:r>
-                        <a:rPr lang="en-US" dirty="0" err="1"/>
-                        <a:t>first_name</a:t>
-                      </a:r>
-                      <a:endParaRPr lang="en-US" dirty="0"/>
+                        <a:rPr lang="en-US" sz="1400" dirty="0" err="1"/>
+                        <a:t>role_id</a:t>
+                      </a:r>
+                      <a:endParaRPr lang="en-US" sz="1400" dirty="0"/>
                     </a:p>
                   </a:txBody>
                   <a:tcPr/>
@@ -5445,8 +5685,8 @@
                     <a:lstStyle/>
                     <a:p>
                       <a:r>
-                        <a:rPr lang="en-US" dirty="0"/>
-                        <a:t>string</a:t>
+                        <a:rPr lang="en-US" sz="1400" dirty="0"/>
+                        <a:t>integer</a:t>
                       </a:r>
                     </a:p>
                   </a:txBody>
@@ -5454,20 +5694,21 @@
                 </a:tc>
                 <a:extLst>
                   <a:ext uri="{0D108BD9-81ED-4DB2-BD59-A6C34878D82A}">
-                    <a16:rowId xmlns:a16="http://schemas.microsoft.com/office/drawing/2014/main" val="4228471355"/>
+                    <a16:rowId xmlns:a16="http://schemas.microsoft.com/office/drawing/2014/main" val="3676500946"/>
                   </a:ext>
                 </a:extLst>
               </a:tr>
-              <a:tr h="298737">
+              <a:tr h="284301">
                 <a:tc>
                   <a:txBody>
                     <a:bodyPr/>
                     <a:lstStyle/>
                     <a:p>
                       <a:r>
-                        <a:rPr lang="en-US" dirty="0"/>
-                        <a:t>email</a:t>
-                      </a:r>
+                        <a:rPr lang="en-US" sz="1400" dirty="0" err="1"/>
+                        <a:t>created_at</a:t>
+                      </a:r>
+                      <a:endParaRPr lang="en-US" sz="1400" dirty="0"/>
                     </a:p>
                   </a:txBody>
                   <a:tcPr/>
@@ -5478,41 +5719,8 @@
                     <a:lstStyle/>
                     <a:p>
                       <a:r>
-                        <a:rPr lang="en-US" dirty="0"/>
-                        <a:t>string</a:t>
-                      </a:r>
-                    </a:p>
-                  </a:txBody>
-                  <a:tcPr/>
-                </a:tc>
-                <a:extLst>
-                  <a:ext uri="{0D108BD9-81ED-4DB2-BD59-A6C34878D82A}">
-                    <a16:rowId xmlns:a16="http://schemas.microsoft.com/office/drawing/2014/main" val="1315471107"/>
-                  </a:ext>
-                </a:extLst>
-              </a:tr>
-              <a:tr h="298737">
-                <a:tc>
-                  <a:txBody>
-                    <a:bodyPr/>
-                    <a:lstStyle/>
-                    <a:p>
-                      <a:r>
-                        <a:rPr lang="en-US" dirty="0"/>
-                        <a:t>password</a:t>
-                      </a:r>
-                    </a:p>
-                  </a:txBody>
-                  <a:tcPr/>
-                </a:tc>
-                <a:tc>
-                  <a:txBody>
-                    <a:bodyPr/>
-                    <a:lstStyle/>
-                    <a:p>
-                      <a:r>
-                        <a:rPr lang="en-US" dirty="0"/>
-                        <a:t>string</a:t>
+                        <a:rPr lang="en-US" sz="1400" dirty="0"/>
+                        <a:t>timestamp</a:t>
                       </a:r>
                     </a:p>
                   </a:txBody>
@@ -5524,17 +5732,17 @@
                   </a:ext>
                 </a:extLst>
               </a:tr>
-              <a:tr h="522789">
+              <a:tr h="487630">
                 <a:tc>
                   <a:txBody>
                     <a:bodyPr/>
                     <a:lstStyle/>
                     <a:p>
                       <a:r>
-                        <a:rPr lang="en-US" dirty="0" err="1"/>
-                        <a:t>password_digest</a:t>
-                      </a:r>
-                      <a:endParaRPr lang="en-US" dirty="0"/>
+                        <a:rPr lang="en-US" sz="1400" dirty="0" err="1"/>
+                        <a:t>updated_at</a:t>
+                      </a:r>
+                      <a:endParaRPr lang="en-US" sz="1400" dirty="0"/>
                     </a:p>
                   </a:txBody>
                   <a:tcPr/>
@@ -5545,8 +5753,8 @@
                     <a:lstStyle/>
                     <a:p>
                       <a:r>
-                        <a:rPr lang="en-US" dirty="0"/>
-                        <a:t>string</a:t>
+                        <a:rPr lang="en-US" sz="1400" dirty="0"/>
+                        <a:t>timestamp</a:t>
                       </a:r>
                     </a:p>
                   </a:txBody>
@@ -5580,8 +5788,8 @@
         </p:nvCxnSpPr>
         <p:spPr>
           <a:xfrm>
-            <a:off x="7090965" y="2484744"/>
-            <a:ext cx="1302543" cy="132080"/>
+            <a:off x="7862662" y="2146277"/>
+            <a:ext cx="554832" cy="194561"/>
           </a:xfrm>
           <a:prstGeom prst="straightConnector1">
             <a:avLst/>
@@ -5623,8 +5831,8 @@
         </p:nvCxnSpPr>
         <p:spPr>
           <a:xfrm flipH="1">
-            <a:off x="9724628" y="4079864"/>
-            <a:ext cx="191698" cy="491957"/>
+            <a:off x="9819548" y="3864838"/>
+            <a:ext cx="120764" cy="280570"/>
           </a:xfrm>
           <a:prstGeom prst="straightConnector1">
             <a:avLst/>
@@ -5665,9 +5873,9 @@
           <p:nvPr/>
         </p:nvCxnSpPr>
         <p:spPr>
-          <a:xfrm>
-            <a:off x="7427120" y="5206878"/>
-            <a:ext cx="1231901" cy="233623"/>
+          <a:xfrm flipV="1">
+            <a:off x="7862662" y="5166488"/>
+            <a:ext cx="554832" cy="83240"/>
           </a:xfrm>
           <a:prstGeom prst="straightConnector1">
             <a:avLst/>
@@ -5971,6 +6179,307 @@
           </a:p>
         </p:txBody>
       </p:sp>
+      <p:cxnSp>
+        <p:nvCxnSpPr>
+          <p:cNvPr id="46" name="Straight Arrow Connector 45">
+            <a:extLst>
+              <a:ext uri="{FF2B5EF4-FFF2-40B4-BE49-F238E27FC236}">
+                <a16:creationId xmlns:a16="http://schemas.microsoft.com/office/drawing/2014/main" id="{8D02DE05-9757-894F-9AB6-4A0EBC9F1F94}"/>
+              </a:ext>
+            </a:extLst>
+          </p:cNvPr>
+          <p:cNvCxnSpPr>
+            <a:cxnSpLocks/>
+            <a:stCxn id="2" idx="1"/>
+            <a:endCxn id="21" idx="3"/>
+          </p:cNvCxnSpPr>
+          <p:nvPr/>
+        </p:nvCxnSpPr>
+        <p:spPr>
+          <a:xfrm flipH="1" flipV="1">
+            <a:off x="5084734" y="1992634"/>
+            <a:ext cx="277416" cy="153643"/>
+          </a:xfrm>
+          <a:prstGeom prst="straightConnector1">
+            <a:avLst/>
+          </a:prstGeom>
+          <a:ln w="38100">
+            <a:tailEnd type="oval"/>
+          </a:ln>
+        </p:spPr>
+        <p:style>
+          <a:lnRef idx="1">
+            <a:schemeClr val="dk1"/>
+          </a:lnRef>
+          <a:fillRef idx="0">
+            <a:schemeClr val="dk1"/>
+          </a:fillRef>
+          <a:effectRef idx="0">
+            <a:schemeClr val="dk1"/>
+          </a:effectRef>
+          <a:fontRef idx="minor">
+            <a:schemeClr val="tx1"/>
+          </a:fontRef>
+        </p:style>
+      </p:cxnSp>
+      <p:graphicFrame>
+        <p:nvGraphicFramePr>
+          <p:cNvPr id="50" name="Table 49">
+            <a:extLst>
+              <a:ext uri="{FF2B5EF4-FFF2-40B4-BE49-F238E27FC236}">
+                <a16:creationId xmlns:a16="http://schemas.microsoft.com/office/drawing/2014/main" id="{67FE5E79-B392-3E4D-92C5-EC1764B59BC7}"/>
+              </a:ext>
+            </a:extLst>
+          </p:cNvPr>
+          <p:cNvGraphicFramePr>
+            <a:graphicFrameLocks noGrp="1"/>
+          </p:cNvGraphicFramePr>
+          <p:nvPr>
+            <p:extLst>
+              <p:ext uri="{D42A27DB-BD31-4B8C-83A1-F6EECF244321}">
+                <p14:modId xmlns:p14="http://schemas.microsoft.com/office/powerpoint/2010/main" val="3733916250"/>
+              </p:ext>
+            </p:extLst>
+          </p:nvPr>
+        </p:nvGraphicFramePr>
+        <p:xfrm>
+          <a:off x="297530" y="904556"/>
+          <a:ext cx="2116186" cy="1706830"/>
+        </p:xfrm>
+        <a:graphic>
+          <a:graphicData uri="http://schemas.openxmlformats.org/drawingml/2006/table">
+            <a:tbl>
+              <a:tblPr firstRow="1" bandRow="1">
+                <a:tableStyleId>{5C22544A-7EE6-4342-B048-85BDC9FD1C3A}</a:tableStyleId>
+              </a:tblPr>
+              <a:tblGrid>
+                <a:gridCol w="1034822">
+                  <a:extLst>
+                    <a:ext uri="{9D8B030D-6E8A-4147-A177-3AD203B41FA5}">
+                      <a16:colId xmlns:a16="http://schemas.microsoft.com/office/drawing/2014/main" val="3448023327"/>
+                    </a:ext>
+                  </a:extLst>
+                </a:gridCol>
+                <a:gridCol w="1081364">
+                  <a:extLst>
+                    <a:ext uri="{9D8B030D-6E8A-4147-A177-3AD203B41FA5}">
+                      <a16:colId xmlns:a16="http://schemas.microsoft.com/office/drawing/2014/main" val="2290228655"/>
+                    </a:ext>
+                  </a:extLst>
+                </a:gridCol>
+              </a:tblGrid>
+              <a:tr h="284301">
+                <a:tc gridSpan="2">
+                  <a:txBody>
+                    <a:bodyPr/>
+                    <a:lstStyle/>
+                    <a:p>
+                      <a:pPr algn="ctr"/>
+                      <a:r>
+                        <a:rPr lang="en-US" sz="1400" dirty="0"/>
+                        <a:t>Role</a:t>
+                      </a:r>
+                    </a:p>
+                  </a:txBody>
+                  <a:tcPr/>
+                </a:tc>
+                <a:tc hMerge="1">
+                  <a:txBody>
+                    <a:bodyPr/>
+                    <a:lstStyle/>
+                    <a:p>
+                      <a:endParaRPr lang="en-US" dirty="0"/>
+                    </a:p>
+                  </a:txBody>
+                  <a:tcPr/>
+                </a:tc>
+                <a:extLst>
+                  <a:ext uri="{0D108BD9-81ED-4DB2-BD59-A6C34878D82A}">
+                    <a16:rowId xmlns:a16="http://schemas.microsoft.com/office/drawing/2014/main" val="1731535737"/>
+                  </a:ext>
+                </a:extLst>
+              </a:tr>
+              <a:tr h="284301">
+                <a:tc>
+                  <a:txBody>
+                    <a:bodyPr/>
+                    <a:lstStyle/>
+                    <a:p>
+                      <a:r>
+                        <a:rPr lang="en-US" sz="1400" dirty="0"/>
+                        <a:t>Id</a:t>
+                      </a:r>
+                    </a:p>
+                  </a:txBody>
+                  <a:tcPr/>
+                </a:tc>
+                <a:tc>
+                  <a:txBody>
+                    <a:bodyPr/>
+                    <a:lstStyle/>
+                    <a:p>
+                      <a:r>
+                        <a:rPr lang="en-US" sz="1400" dirty="0"/>
+                        <a:t>integer</a:t>
+                      </a:r>
+                    </a:p>
+                  </a:txBody>
+                  <a:tcPr/>
+                </a:tc>
+                <a:extLst>
+                  <a:ext uri="{0D108BD9-81ED-4DB2-BD59-A6C34878D82A}">
+                    <a16:rowId xmlns:a16="http://schemas.microsoft.com/office/drawing/2014/main" val="3544689962"/>
+                  </a:ext>
+                </a:extLst>
+              </a:tr>
+              <a:tr h="284301">
+                <a:tc>
+                  <a:txBody>
+                    <a:bodyPr/>
+                    <a:lstStyle/>
+                    <a:p>
+                      <a:r>
+                        <a:rPr lang="en-US" sz="1400" dirty="0"/>
+                        <a:t>role</a:t>
+                      </a:r>
+                    </a:p>
+                  </a:txBody>
+                  <a:tcPr/>
+                </a:tc>
+                <a:tc>
+                  <a:txBody>
+                    <a:bodyPr/>
+                    <a:lstStyle/>
+                    <a:p>
+                      <a:r>
+                        <a:rPr lang="en-US" sz="1400" dirty="0"/>
+                        <a:t>string</a:t>
+                      </a:r>
+                    </a:p>
+                  </a:txBody>
+                  <a:tcPr/>
+                </a:tc>
+                <a:extLst>
+                  <a:ext uri="{0D108BD9-81ED-4DB2-BD59-A6C34878D82A}">
+                    <a16:rowId xmlns:a16="http://schemas.microsoft.com/office/drawing/2014/main" val="233484288"/>
+                  </a:ext>
+                </a:extLst>
+              </a:tr>
+              <a:tr h="284301">
+                <a:tc>
+                  <a:txBody>
+                    <a:bodyPr/>
+                    <a:lstStyle/>
+                    <a:p>
+                      <a:r>
+                        <a:rPr lang="en-US" sz="1400" dirty="0" err="1"/>
+                        <a:t>created_at</a:t>
+                      </a:r>
+                      <a:endParaRPr lang="en-US" sz="1400" dirty="0"/>
+                    </a:p>
+                  </a:txBody>
+                  <a:tcPr/>
+                </a:tc>
+                <a:tc>
+                  <a:txBody>
+                    <a:bodyPr/>
+                    <a:lstStyle/>
+                    <a:p>
+                      <a:r>
+                        <a:rPr lang="en-US" sz="1400" dirty="0"/>
+                        <a:t>timestamp</a:t>
+                      </a:r>
+                    </a:p>
+                  </a:txBody>
+                  <a:tcPr/>
+                </a:tc>
+                <a:extLst>
+                  <a:ext uri="{0D108BD9-81ED-4DB2-BD59-A6C34878D82A}">
+                    <a16:rowId xmlns:a16="http://schemas.microsoft.com/office/drawing/2014/main" val="4152723303"/>
+                  </a:ext>
+                </a:extLst>
+              </a:tr>
+              <a:tr h="487630">
+                <a:tc>
+                  <a:txBody>
+                    <a:bodyPr/>
+                    <a:lstStyle/>
+                    <a:p>
+                      <a:r>
+                        <a:rPr lang="en-US" sz="1400" dirty="0" err="1"/>
+                        <a:t>updated_at</a:t>
+                      </a:r>
+                      <a:endParaRPr lang="en-US" sz="1400" dirty="0"/>
+                    </a:p>
+                  </a:txBody>
+                  <a:tcPr/>
+                </a:tc>
+                <a:tc>
+                  <a:txBody>
+                    <a:bodyPr/>
+                    <a:lstStyle/>
+                    <a:p>
+                      <a:r>
+                        <a:rPr lang="en-US" sz="1400" dirty="0"/>
+                        <a:t>timestamp</a:t>
+                      </a:r>
+                    </a:p>
+                  </a:txBody>
+                  <a:tcPr/>
+                </a:tc>
+                <a:extLst>
+                  <a:ext uri="{0D108BD9-81ED-4DB2-BD59-A6C34878D82A}">
+                    <a16:rowId xmlns:a16="http://schemas.microsoft.com/office/drawing/2014/main" val="2950346607"/>
+                  </a:ext>
+                </a:extLst>
+              </a:tr>
+            </a:tbl>
+          </a:graphicData>
+        </a:graphic>
+      </p:graphicFrame>
+      <p:cxnSp>
+        <p:nvCxnSpPr>
+          <p:cNvPr id="51" name="Straight Arrow Connector 50">
+            <a:extLst>
+              <a:ext uri="{FF2B5EF4-FFF2-40B4-BE49-F238E27FC236}">
+                <a16:creationId xmlns:a16="http://schemas.microsoft.com/office/drawing/2014/main" id="{672F6B2F-FAE1-0345-A207-ABFA787251C9}"/>
+              </a:ext>
+            </a:extLst>
+          </p:cNvPr>
+          <p:cNvCxnSpPr>
+            <a:cxnSpLocks/>
+            <a:stCxn id="50" idx="3"/>
+            <a:endCxn id="21" idx="1"/>
+          </p:cNvCxnSpPr>
+          <p:nvPr/>
+        </p:nvCxnSpPr>
+        <p:spPr>
+          <a:xfrm>
+            <a:off x="2413716" y="1757971"/>
+            <a:ext cx="554832" cy="234663"/>
+          </a:xfrm>
+          <a:prstGeom prst="straightConnector1">
+            <a:avLst/>
+          </a:prstGeom>
+          <a:ln w="38100">
+            <a:tailEnd type="oval"/>
+          </a:ln>
+        </p:spPr>
+        <p:style>
+          <a:lnRef idx="1">
+            <a:schemeClr val="dk1"/>
+          </a:lnRef>
+          <a:fillRef idx="0">
+            <a:schemeClr val="dk1"/>
+          </a:fillRef>
+          <a:effectRef idx="0">
+            <a:schemeClr val="dk1"/>
+          </a:effectRef>
+          <a:fontRef idx="minor">
+            <a:schemeClr val="tx1"/>
+          </a:fontRef>
+        </p:style>
+      </p:cxnSp>
     </p:spTree>
     <p:extLst>
       <p:ext uri="{BB962C8B-B14F-4D97-AF65-F5344CB8AC3E}">

</xml_diff>